<commit_message>
odkaz na stránku s přehledem textů v XML TEI (https://wiki.tei-c.org/index.php/Samples_of_TEI_texts)
</commit_message>
<xml_diff>
--- a/Presentations/04-RIDICS_Zaklady-XML-TEI-Standard-XML-TEI-Uvod.pptx
+++ b/Presentations/04-RIDICS_Zaklady-XML-TEI-Standard-XML-TEI-Uvod.pptx
@@ -262,7 +262,7 @@
           <a:p>
             <a:fld id="{693D0AAB-BC65-4D93-BE30-329DE1D7C511}" type="datetimeFigureOut">
               <a:rPr lang="cs-CZ" smtClean="0"/>
-              <a:t>09.05.2019</a:t>
+              <a:t>12.05.2019</a:t>
             </a:fld>
             <a:endParaRPr lang="cs-CZ"/>
           </a:p>
@@ -371,7 +371,7 @@
           <a:p>
             <a:fld id="{BF6F0682-C2CD-439F-BD5E-D51593A61157}" type="datetimeFigureOut">
               <a:rPr lang="cs-CZ" smtClean="0"/>
-              <a:t>09.05.2019</a:t>
+              <a:t>12.05.2019</a:t>
             </a:fld>
             <a:endParaRPr lang="cs-CZ"/>
           </a:p>
@@ -5633,7 +5633,9 @@
         </p:nvSpPr>
         <p:spPr/>
         <p:txBody>
-          <a:bodyPr/>
+          <a:bodyPr>
+            <a:normAutofit fontScale="92500" lnSpcReduction="10000"/>
+          </a:bodyPr>
           <a:lstStyle/>
           <a:p>
             <a:r>
@@ -5730,11 +5732,22 @@
             </a:r>
             <a:r>
               <a:rPr lang="cs-CZ" dirty="0"/>
-              <a:t> </a:t>
-            </a:r>
-            <a:r>
-              <a:rPr lang="cs-CZ"/>
-              <a:t>(historie)</a:t>
+              <a:t> (historie)</a:t>
+            </a:r>
+          </a:p>
+          <a:p>
+            <a:r>
+              <a:rPr lang="cs-CZ" dirty="0"/>
+              <a:t>Dokumenty v XML TEI</a:t>
+            </a:r>
+          </a:p>
+          <a:p>
+            <a:pPr lvl="1"/>
+            <a:r>
+              <a:rPr lang="cs-CZ" dirty="0">
+                <a:hlinkClick r:id="rId8"/>
+              </a:rPr>
+              <a:t>https://wiki.tei-c.org/index.php/Samples_of_TEI_texts</a:t>
             </a:r>
             <a:endParaRPr lang="cs-CZ" dirty="0"/>
           </a:p>

</xml_diff>